<commit_message>
Updated pipeline figure to vector format.
</commit_message>
<xml_diff>
--- a/pipeline.pptx
+++ b/pipeline.pptx
@@ -7,7 +7,7 @@
   <p:sldIdLst>
     <p:sldId id="257" r:id="rId2"/>
   </p:sldIdLst>
-  <p:sldSz cx="9144000" cy="6858000" type="screen4x3"/>
+  <p:sldSz cx="9144000" cy="5870575"/>
   <p:notesSz cx="6858000" cy="9144000"/>
   <p:defaultTextStyle>
     <a:defPPr>
@@ -136,8 +136,8 @@
         </p:nvSpPr>
         <p:spPr>
           <a:xfrm>
-            <a:off x="685800" y="1122363"/>
-            <a:ext cx="7772400" cy="2387600"/>
+            <a:off x="685800" y="960764"/>
+            <a:ext cx="7772400" cy="2043830"/>
           </a:xfrm>
         </p:spPr>
         <p:txBody>
@@ -168,8 +168,8 @@
         </p:nvSpPr>
         <p:spPr>
           <a:xfrm>
-            <a:off x="1143000" y="3602038"/>
-            <a:ext cx="6858000" cy="1655762"/>
+            <a:off x="1143000" y="3083412"/>
+            <a:ext cx="6858000" cy="1417363"/>
           </a:xfrm>
         </p:spPr>
         <p:txBody>
@@ -238,7 +238,7 @@
           <a:p>
             <a:fld id="{DBB7A20D-390A-4A6E-BC2A-B938892C3B13}" type="datetimeFigureOut">
               <a:rPr lang="sl-SI" smtClean="0"/>
-              <a:t>18.7.2015</a:t>
+              <a:t>04/09/15</a:t>
             </a:fld>
             <a:endParaRPr lang="sl-SI"/>
           </a:p>
@@ -408,7 +408,7 @@
           <a:p>
             <a:fld id="{DBB7A20D-390A-4A6E-BC2A-B938892C3B13}" type="datetimeFigureOut">
               <a:rPr lang="sl-SI" smtClean="0"/>
-              <a:t>18.7.2015</a:t>
+              <a:t>04/09/15</a:t>
             </a:fld>
             <a:endParaRPr lang="sl-SI"/>
           </a:p>
@@ -498,8 +498,8 @@
         </p:nvSpPr>
         <p:spPr>
           <a:xfrm>
-            <a:off x="6543675" y="365125"/>
-            <a:ext cx="1971675" cy="5811838"/>
+            <a:off x="6543676" y="312554"/>
+            <a:ext cx="1971675" cy="4975042"/>
           </a:xfrm>
         </p:spPr>
         <p:txBody>
@@ -526,8 +526,8 @@
         </p:nvSpPr>
         <p:spPr>
           <a:xfrm>
-            <a:off x="628650" y="365125"/>
-            <a:ext cx="5800725" cy="5811838"/>
+            <a:off x="628653" y="312554"/>
+            <a:ext cx="5800725" cy="4975042"/>
           </a:xfrm>
         </p:spPr>
         <p:txBody>
@@ -588,7 +588,7 @@
           <a:p>
             <a:fld id="{DBB7A20D-390A-4A6E-BC2A-B938892C3B13}" type="datetimeFigureOut">
               <a:rPr lang="sl-SI" smtClean="0"/>
-              <a:t>18.7.2015</a:t>
+              <a:t>04/09/15</a:t>
             </a:fld>
             <a:endParaRPr lang="sl-SI"/>
           </a:p>
@@ -758,7 +758,7 @@
           <a:p>
             <a:fld id="{DBB7A20D-390A-4A6E-BC2A-B938892C3B13}" type="datetimeFigureOut">
               <a:rPr lang="sl-SI" smtClean="0"/>
-              <a:t>18.7.2015</a:t>
+              <a:t>04/09/15</a:t>
             </a:fld>
             <a:endParaRPr lang="sl-SI"/>
           </a:p>
@@ -848,8 +848,8 @@
         </p:nvSpPr>
         <p:spPr>
           <a:xfrm>
-            <a:off x="623888" y="1709739"/>
-            <a:ext cx="7886700" cy="2852737"/>
+            <a:off x="623888" y="1463570"/>
+            <a:ext cx="7886700" cy="2441995"/>
           </a:xfrm>
         </p:spPr>
         <p:txBody>
@@ -880,8 +880,8 @@
         </p:nvSpPr>
         <p:spPr>
           <a:xfrm>
-            <a:off x="623888" y="4589464"/>
-            <a:ext cx="7886700" cy="1500187"/>
+            <a:off x="623888" y="3928667"/>
+            <a:ext cx="7886700" cy="1284187"/>
           </a:xfrm>
         </p:spPr>
         <p:txBody>
@@ -1002,7 +1002,7 @@
           <a:p>
             <a:fld id="{DBB7A20D-390A-4A6E-BC2A-B938892C3B13}" type="datetimeFigureOut">
               <a:rPr lang="sl-SI" smtClean="0"/>
-              <a:t>18.7.2015</a:t>
+              <a:t>04/09/15</a:t>
             </a:fld>
             <a:endParaRPr lang="sl-SI"/>
           </a:p>
@@ -1115,8 +1115,8 @@
         </p:nvSpPr>
         <p:spPr>
           <a:xfrm>
-            <a:off x="628650" y="1825625"/>
-            <a:ext cx="3886200" cy="4351338"/>
+            <a:off x="628650" y="1562769"/>
+            <a:ext cx="3886200" cy="3724826"/>
           </a:xfrm>
         </p:spPr>
         <p:txBody>
@@ -1172,8 +1172,8 @@
         </p:nvSpPr>
         <p:spPr>
           <a:xfrm>
-            <a:off x="4629150" y="1825625"/>
-            <a:ext cx="3886200" cy="4351338"/>
+            <a:off x="4629150" y="1562769"/>
+            <a:ext cx="3886200" cy="3724826"/>
           </a:xfrm>
         </p:spPr>
         <p:txBody>
@@ -1234,7 +1234,7 @@
           <a:p>
             <a:fld id="{DBB7A20D-390A-4A6E-BC2A-B938892C3B13}" type="datetimeFigureOut">
               <a:rPr lang="sl-SI" smtClean="0"/>
-              <a:t>18.7.2015</a:t>
+              <a:t>04/09/15</a:t>
             </a:fld>
             <a:endParaRPr lang="sl-SI"/>
           </a:p>
@@ -1324,8 +1324,8 @@
         </p:nvSpPr>
         <p:spPr>
           <a:xfrm>
-            <a:off x="629841" y="365126"/>
-            <a:ext cx="7886700" cy="1325563"/>
+            <a:off x="629841" y="312556"/>
+            <a:ext cx="7886700" cy="1134706"/>
           </a:xfrm>
         </p:spPr>
         <p:txBody>
@@ -1352,8 +1352,8 @@
         </p:nvSpPr>
         <p:spPr>
           <a:xfrm>
-            <a:off x="629842" y="1681163"/>
-            <a:ext cx="3868340" cy="823912"/>
+            <a:off x="629842" y="1439107"/>
+            <a:ext cx="3868340" cy="705284"/>
           </a:xfrm>
         </p:spPr>
         <p:txBody>
@@ -1417,8 +1417,8 @@
         </p:nvSpPr>
         <p:spPr>
           <a:xfrm>
-            <a:off x="629842" y="2505075"/>
-            <a:ext cx="3868340" cy="3684588"/>
+            <a:off x="629842" y="2144391"/>
+            <a:ext cx="3868340" cy="3154076"/>
           </a:xfrm>
         </p:spPr>
         <p:txBody>
@@ -1474,8 +1474,8 @@
         </p:nvSpPr>
         <p:spPr>
           <a:xfrm>
-            <a:off x="4629150" y="1681163"/>
-            <a:ext cx="3887391" cy="823912"/>
+            <a:off x="4629153" y="1439107"/>
+            <a:ext cx="3887391" cy="705284"/>
           </a:xfrm>
         </p:spPr>
         <p:txBody>
@@ -1539,8 +1539,8 @@
         </p:nvSpPr>
         <p:spPr>
           <a:xfrm>
-            <a:off x="4629150" y="2505075"/>
-            <a:ext cx="3887391" cy="3684588"/>
+            <a:off x="4629153" y="2144391"/>
+            <a:ext cx="3887391" cy="3154076"/>
           </a:xfrm>
         </p:spPr>
         <p:txBody>
@@ -1601,7 +1601,7 @@
           <a:p>
             <a:fld id="{DBB7A20D-390A-4A6E-BC2A-B938892C3B13}" type="datetimeFigureOut">
               <a:rPr lang="sl-SI" smtClean="0"/>
-              <a:t>18.7.2015</a:t>
+              <a:t>04/09/15</a:t>
             </a:fld>
             <a:endParaRPr lang="sl-SI"/>
           </a:p>
@@ -1719,7 +1719,7 @@
           <a:p>
             <a:fld id="{DBB7A20D-390A-4A6E-BC2A-B938892C3B13}" type="datetimeFigureOut">
               <a:rPr lang="sl-SI" smtClean="0"/>
-              <a:t>18.7.2015</a:t>
+              <a:t>04/09/15</a:t>
             </a:fld>
             <a:endParaRPr lang="sl-SI"/>
           </a:p>
@@ -1814,7 +1814,7 @@
           <a:p>
             <a:fld id="{DBB7A20D-390A-4A6E-BC2A-B938892C3B13}" type="datetimeFigureOut">
               <a:rPr lang="sl-SI" smtClean="0"/>
-              <a:t>18.7.2015</a:t>
+              <a:t>04/09/15</a:t>
             </a:fld>
             <a:endParaRPr lang="sl-SI"/>
           </a:p>
@@ -1904,8 +1904,8 @@
         </p:nvSpPr>
         <p:spPr>
           <a:xfrm>
-            <a:off x="629841" y="457200"/>
-            <a:ext cx="2949178" cy="1600200"/>
+            <a:off x="629841" y="391372"/>
+            <a:ext cx="2949178" cy="1369801"/>
           </a:xfrm>
         </p:spPr>
         <p:txBody>
@@ -1936,8 +1936,8 @@
         </p:nvSpPr>
         <p:spPr>
           <a:xfrm>
-            <a:off x="3887391" y="987426"/>
-            <a:ext cx="4629150" cy="4873625"/>
+            <a:off x="3887391" y="845257"/>
+            <a:ext cx="4629150" cy="4171913"/>
           </a:xfrm>
         </p:spPr>
         <p:txBody>
@@ -2021,8 +2021,8 @@
         </p:nvSpPr>
         <p:spPr>
           <a:xfrm>
-            <a:off x="629841" y="2057400"/>
-            <a:ext cx="2949178" cy="3811588"/>
+            <a:off x="629841" y="1761173"/>
+            <a:ext cx="2949178" cy="3262790"/>
           </a:xfrm>
         </p:spPr>
         <p:txBody>
@@ -2091,7 +2091,7 @@
           <a:p>
             <a:fld id="{DBB7A20D-390A-4A6E-BC2A-B938892C3B13}" type="datetimeFigureOut">
               <a:rPr lang="sl-SI" smtClean="0"/>
-              <a:t>18.7.2015</a:t>
+              <a:t>04/09/15</a:t>
             </a:fld>
             <a:endParaRPr lang="sl-SI"/>
           </a:p>
@@ -2181,8 +2181,8 @@
         </p:nvSpPr>
         <p:spPr>
           <a:xfrm>
-            <a:off x="629841" y="457200"/>
-            <a:ext cx="2949178" cy="1600200"/>
+            <a:off x="629841" y="391372"/>
+            <a:ext cx="2949178" cy="1369801"/>
           </a:xfrm>
         </p:spPr>
         <p:txBody>
@@ -2213,8 +2213,8 @@
         </p:nvSpPr>
         <p:spPr>
           <a:xfrm>
-            <a:off x="3887391" y="987426"/>
-            <a:ext cx="4629150" cy="4873625"/>
+            <a:off x="3887391" y="845257"/>
+            <a:ext cx="4629150" cy="4171913"/>
           </a:xfrm>
         </p:spPr>
         <p:txBody>
@@ -2278,8 +2278,8 @@
         </p:nvSpPr>
         <p:spPr>
           <a:xfrm>
-            <a:off x="629841" y="2057400"/>
-            <a:ext cx="2949178" cy="3811588"/>
+            <a:off x="629841" y="1761173"/>
+            <a:ext cx="2949178" cy="3262790"/>
           </a:xfrm>
         </p:spPr>
         <p:txBody>
@@ -2348,7 +2348,7 @@
           <a:p>
             <a:fld id="{DBB7A20D-390A-4A6E-BC2A-B938892C3B13}" type="datetimeFigureOut">
               <a:rPr lang="sl-SI" smtClean="0"/>
-              <a:t>18.7.2015</a:t>
+              <a:t>04/09/15</a:t>
             </a:fld>
             <a:endParaRPr lang="sl-SI"/>
           </a:p>
@@ -2443,8 +2443,8 @@
         </p:nvSpPr>
         <p:spPr>
           <a:xfrm>
-            <a:off x="628650" y="365126"/>
-            <a:ext cx="7886700" cy="1325563"/>
+            <a:off x="628650" y="312556"/>
+            <a:ext cx="7886700" cy="1134706"/>
           </a:xfrm>
           <a:prstGeom prst="rect">
             <a:avLst/>
@@ -2476,8 +2476,8 @@
         </p:nvSpPr>
         <p:spPr>
           <a:xfrm>
-            <a:off x="628650" y="1825625"/>
-            <a:ext cx="7886700" cy="4351338"/>
+            <a:off x="628650" y="1562769"/>
+            <a:ext cx="7886700" cy="3724826"/>
           </a:xfrm>
           <a:prstGeom prst="rect">
             <a:avLst/>
@@ -2538,8 +2538,8 @@
         </p:nvSpPr>
         <p:spPr>
           <a:xfrm>
-            <a:off x="628650" y="6356351"/>
-            <a:ext cx="2057400" cy="365125"/>
+            <a:off x="628650" y="5441155"/>
+            <a:ext cx="2057400" cy="312554"/>
           </a:xfrm>
           <a:prstGeom prst="rect">
             <a:avLst/>
@@ -2561,7 +2561,7 @@
           <a:p>
             <a:fld id="{DBB7A20D-390A-4A6E-BC2A-B938892C3B13}" type="datetimeFigureOut">
               <a:rPr lang="sl-SI" smtClean="0"/>
-              <a:t>18.7.2015</a:t>
+              <a:t>04/09/15</a:t>
             </a:fld>
             <a:endParaRPr lang="sl-SI"/>
           </a:p>
@@ -2579,8 +2579,8 @@
         </p:nvSpPr>
         <p:spPr>
           <a:xfrm>
-            <a:off x="3028950" y="6356351"/>
-            <a:ext cx="3086100" cy="365125"/>
+            <a:off x="3028950" y="5441155"/>
+            <a:ext cx="3086100" cy="312554"/>
           </a:xfrm>
           <a:prstGeom prst="rect">
             <a:avLst/>
@@ -2616,8 +2616,8 @@
         </p:nvSpPr>
         <p:spPr>
           <a:xfrm>
-            <a:off x="6457950" y="6356351"/>
-            <a:ext cx="2057400" cy="365125"/>
+            <a:off x="6457950" y="5441155"/>
+            <a:ext cx="2057400" cy="312554"/>
           </a:xfrm>
           <a:prstGeom prst="rect">
             <a:avLst/>
@@ -2968,13 +2968,13 @@
       </p:grpSpPr>
       <p:sp>
         <p:nvSpPr>
-          <p:cNvPr id="35" name="Rectangle 34"/>
+          <p:cNvPr id="98" name="Rectangle 97"/>
           <p:cNvSpPr/>
           <p:nvPr/>
         </p:nvSpPr>
         <p:spPr>
           <a:xfrm>
-            <a:off x="4335098" y="1775587"/>
+            <a:off x="4323918" y="896977"/>
             <a:ext cx="2040689" cy="4956142"/>
           </a:xfrm>
           <a:prstGeom prst="rect">
@@ -3013,13 +3013,13 @@
       </p:sp>
       <p:sp>
         <p:nvSpPr>
-          <p:cNvPr id="5" name="Rectangle 4"/>
+          <p:cNvPr id="99" name="Rectangle 98"/>
           <p:cNvSpPr/>
           <p:nvPr/>
         </p:nvSpPr>
         <p:spPr>
           <a:xfrm>
-            <a:off x="1697198" y="1772816"/>
+            <a:off x="1686018" y="894206"/>
             <a:ext cx="2040689" cy="4956142"/>
           </a:xfrm>
           <a:prstGeom prst="rect">
@@ -3058,13 +3058,13 @@
       </p:sp>
       <p:sp>
         <p:nvSpPr>
-          <p:cNvPr id="6" name="Right Arrow 5"/>
+          <p:cNvPr id="100" name="Right Arrow 99"/>
           <p:cNvSpPr/>
           <p:nvPr/>
         </p:nvSpPr>
         <p:spPr>
           <a:xfrm>
-            <a:off x="1186138" y="3900472"/>
+            <a:off x="1174958" y="3021862"/>
             <a:ext cx="479834" cy="484632"/>
           </a:xfrm>
           <a:prstGeom prst="rightArrow">
@@ -3108,13 +3108,13 @@
       </p:sp>
       <p:sp>
         <p:nvSpPr>
-          <p:cNvPr id="7" name="Rectangle 6"/>
+          <p:cNvPr id="101" name="Rectangle 100"/>
           <p:cNvSpPr/>
           <p:nvPr/>
         </p:nvSpPr>
         <p:spPr>
           <a:xfrm>
-            <a:off x="1874379" y="4695784"/>
+            <a:off x="1863199" y="3817174"/>
             <a:ext cx="1662818" cy="821872"/>
           </a:xfrm>
           <a:prstGeom prst="rect">
@@ -3134,13 +3134,7 @@
             </a:solidFill>
             <a:round/>
           </a:ln>
-          <a:effectLst>
-            <a:outerShdw blurRad="50800" dist="38100" dir="2700000" algn="tl" rotWithShape="0">
-              <a:prstClr val="black">
-                <a:alpha val="40000"/>
-              </a:prstClr>
-            </a:outerShdw>
-          </a:effectLst>
+          <a:effectLst/>
         </p:spPr>
         <p:style>
           <a:lnRef idx="2">
@@ -3215,13 +3209,13 @@
       </p:sp>
       <p:sp>
         <p:nvSpPr>
-          <p:cNvPr id="8" name="Rectangle 7"/>
+          <p:cNvPr id="102" name="Rectangle 101"/>
           <p:cNvSpPr/>
           <p:nvPr/>
         </p:nvSpPr>
         <p:spPr>
           <a:xfrm>
-            <a:off x="1874379" y="1928358"/>
+            <a:off x="1863199" y="1049748"/>
             <a:ext cx="1662818" cy="658818"/>
           </a:xfrm>
           <a:prstGeom prst="rect">
@@ -3238,13 +3232,7 @@
             </a:solidFill>
             <a:round/>
           </a:ln>
-          <a:effectLst>
-            <a:outerShdw blurRad="50800" dist="38100" dir="2700000" algn="tl" rotWithShape="0">
-              <a:prstClr val="black">
-                <a:alpha val="40000"/>
-              </a:prstClr>
-            </a:outerShdw>
-          </a:effectLst>
+          <a:effectLst/>
         </p:spPr>
         <p:style>
           <a:lnRef idx="2">
@@ -3319,13 +3307,13 @@
       </p:sp>
       <p:sp>
         <p:nvSpPr>
-          <p:cNvPr id="9" name="Right Arrow 8"/>
+          <p:cNvPr id="103" name="Right Arrow 102"/>
           <p:cNvSpPr/>
           <p:nvPr/>
         </p:nvSpPr>
         <p:spPr>
           <a:xfrm>
-            <a:off x="3799049" y="3900472"/>
+            <a:off x="3787869" y="3021862"/>
             <a:ext cx="479834" cy="484632"/>
           </a:xfrm>
           <a:prstGeom prst="rightArrow">
@@ -3369,13 +3357,13 @@
       </p:sp>
       <p:sp>
         <p:nvSpPr>
-          <p:cNvPr id="10" name="Rectangle 9"/>
+          <p:cNvPr id="104" name="Rectangle 103"/>
           <p:cNvSpPr/>
           <p:nvPr/>
         </p:nvSpPr>
         <p:spPr>
           <a:xfrm>
-            <a:off x="4534594" y="2618473"/>
+            <a:off x="4523414" y="1739863"/>
             <a:ext cx="1575303" cy="663445"/>
           </a:xfrm>
           <a:prstGeom prst="rect">
@@ -3392,13 +3380,7 @@
             </a:solidFill>
             <a:round/>
           </a:ln>
-          <a:effectLst>
-            <a:outerShdw blurRad="50800" dist="38100" dir="2700000" algn="tl" rotWithShape="0">
-              <a:prstClr val="black">
-                <a:alpha val="40000"/>
-              </a:prstClr>
-            </a:outerShdw>
-          </a:effectLst>
+          <a:effectLst/>
         </p:spPr>
         <p:style>
           <a:lnRef idx="2">
@@ -3453,13 +3435,13 @@
       </p:sp>
       <p:sp>
         <p:nvSpPr>
-          <p:cNvPr id="11" name="Rectangle 10"/>
+          <p:cNvPr id="105" name="Rectangle 104"/>
           <p:cNvSpPr/>
           <p:nvPr/>
         </p:nvSpPr>
         <p:spPr>
           <a:xfrm>
-            <a:off x="4541383" y="4128856"/>
+            <a:off x="4530203" y="3250246"/>
             <a:ext cx="1575303" cy="940843"/>
           </a:xfrm>
           <a:prstGeom prst="rect">
@@ -3479,13 +3461,7 @@
             </a:solidFill>
             <a:round/>
           </a:ln>
-          <a:effectLst>
-            <a:outerShdw blurRad="50800" dist="38100" dir="2700000" algn="tl" rotWithShape="0">
-              <a:prstClr val="black">
-                <a:alpha val="40000"/>
-              </a:prstClr>
-            </a:outerShdw>
-          </a:effectLst>
+          <a:effectLst/>
         </p:spPr>
         <p:style>
           <a:lnRef idx="2">
@@ -3570,13 +3546,13 @@
       </p:sp>
       <p:sp>
         <p:nvSpPr>
-          <p:cNvPr id="12" name="Right Arrow 11"/>
+          <p:cNvPr id="106" name="Right Arrow 105"/>
           <p:cNvSpPr/>
           <p:nvPr/>
         </p:nvSpPr>
         <p:spPr>
           <a:xfrm>
-            <a:off x="6486363" y="3900472"/>
+            <a:off x="6475183" y="3021862"/>
             <a:ext cx="479834" cy="484632"/>
           </a:xfrm>
           <a:prstGeom prst="rightArrow">
@@ -3620,13 +3596,13 @@
       </p:sp>
       <p:sp>
         <p:nvSpPr>
-          <p:cNvPr id="13" name="Down Arrow 12"/>
+          <p:cNvPr id="107" name="Down Arrow 106"/>
           <p:cNvSpPr/>
           <p:nvPr/>
         </p:nvSpPr>
         <p:spPr>
           <a:xfrm>
-            <a:off x="7505522" y="2910658"/>
+            <a:off x="7494342" y="2032048"/>
             <a:ext cx="706171" cy="389300"/>
           </a:xfrm>
           <a:prstGeom prst="downArrow">
@@ -3666,13 +3642,13 @@
       </p:sp>
       <p:sp>
         <p:nvSpPr>
-          <p:cNvPr id="14" name="Down Arrow 13"/>
+          <p:cNvPr id="108" name="Down Arrow 107"/>
           <p:cNvSpPr/>
           <p:nvPr/>
         </p:nvSpPr>
         <p:spPr>
           <a:xfrm>
-            <a:off x="7996212" y="5349058"/>
+            <a:off x="7985032" y="4470448"/>
             <a:ext cx="706171" cy="389300"/>
           </a:xfrm>
           <a:prstGeom prst="downArrow">
@@ -3712,13 +3688,13 @@
       </p:sp>
       <p:sp>
         <p:nvSpPr>
-          <p:cNvPr id="15" name="Rectangle 14"/>
+          <p:cNvPr id="109" name="Rectangle 108"/>
           <p:cNvSpPr/>
           <p:nvPr/>
         </p:nvSpPr>
         <p:spPr>
           <a:xfrm>
-            <a:off x="4541383" y="3374382"/>
+            <a:off x="4530203" y="2495772"/>
             <a:ext cx="1575303" cy="663445"/>
           </a:xfrm>
           <a:prstGeom prst="rect">
@@ -3735,13 +3711,7 @@
             </a:solidFill>
             <a:round/>
           </a:ln>
-          <a:effectLst>
-            <a:outerShdw blurRad="50800" dist="38100" dir="2700000" algn="tl" rotWithShape="0">
-              <a:prstClr val="black">
-                <a:alpha val="40000"/>
-              </a:prstClr>
-            </a:outerShdw>
-          </a:effectLst>
+          <a:effectLst/>
         </p:spPr>
         <p:style>
           <a:lnRef idx="2">
@@ -3816,13 +3786,13 @@
       </p:sp>
       <p:sp>
         <p:nvSpPr>
-          <p:cNvPr id="16" name="TextBox 15"/>
+          <p:cNvPr id="110" name="TextBox 109"/>
           <p:cNvSpPr txBox="1"/>
           <p:nvPr/>
         </p:nvSpPr>
         <p:spPr>
           <a:xfrm>
-            <a:off x="108200" y="922710"/>
+            <a:off x="97020" y="44100"/>
             <a:ext cx="1228387" cy="646331"/>
           </a:xfrm>
           <a:prstGeom prst="rect">
@@ -3851,13 +3821,13 @@
       </p:sp>
       <p:sp>
         <p:nvSpPr>
-          <p:cNvPr id="17" name="TextBox 16"/>
+          <p:cNvPr id="111" name="TextBox 110"/>
           <p:cNvSpPr txBox="1"/>
           <p:nvPr/>
         </p:nvSpPr>
         <p:spPr>
           <a:xfrm>
-            <a:off x="1665975" y="922710"/>
+            <a:off x="1654795" y="44100"/>
             <a:ext cx="1829731" cy="646331"/>
           </a:xfrm>
           <a:prstGeom prst="rect">
@@ -3882,13 +3852,13 @@
       </p:sp>
       <p:sp>
         <p:nvSpPr>
-          <p:cNvPr id="18" name="TextBox 17"/>
+          <p:cNvPr id="112" name="TextBox 111"/>
           <p:cNvSpPr txBox="1"/>
           <p:nvPr/>
         </p:nvSpPr>
         <p:spPr>
           <a:xfrm>
-            <a:off x="4333154" y="922710"/>
+            <a:off x="4321974" y="44100"/>
             <a:ext cx="1829731" cy="646331"/>
           </a:xfrm>
           <a:prstGeom prst="rect">
@@ -3921,13 +3891,13 @@
       </p:sp>
       <p:sp>
         <p:nvSpPr>
-          <p:cNvPr id="19" name="TextBox 18"/>
+          <p:cNvPr id="113" name="TextBox 112"/>
           <p:cNvSpPr txBox="1"/>
           <p:nvPr/>
         </p:nvSpPr>
         <p:spPr>
           <a:xfrm>
-            <a:off x="6872652" y="922710"/>
+            <a:off x="6861472" y="44100"/>
             <a:ext cx="1829731" cy="646331"/>
           </a:xfrm>
           <a:prstGeom prst="rect">
@@ -3968,13 +3938,13 @@
       </p:sp>
       <p:cxnSp>
         <p:nvCxnSpPr>
-          <p:cNvPr id="20" name="Straight Arrow Connector 19"/>
+          <p:cNvPr id="114" name="Straight Arrow Connector 113"/>
           <p:cNvCxnSpPr/>
           <p:nvPr/>
         </p:nvCxnSpPr>
         <p:spPr>
           <a:xfrm>
-            <a:off x="1289363" y="1239576"/>
+            <a:off x="1278183" y="360966"/>
             <a:ext cx="419034" cy="0"/>
           </a:xfrm>
           <a:prstGeom prst="straightConnector1">
@@ -4006,13 +3976,13 @@
       </p:cxnSp>
       <p:cxnSp>
         <p:nvCxnSpPr>
-          <p:cNvPr id="21" name="Straight Arrow Connector 20"/>
+          <p:cNvPr id="115" name="Straight Arrow Connector 114"/>
           <p:cNvCxnSpPr/>
           <p:nvPr/>
         </p:nvCxnSpPr>
         <p:spPr>
           <a:xfrm>
-            <a:off x="3771835" y="1239576"/>
+            <a:off x="3760655" y="360966"/>
             <a:ext cx="419034" cy="0"/>
           </a:xfrm>
           <a:prstGeom prst="straightConnector1">
@@ -4044,13 +4014,13 @@
       </p:cxnSp>
       <p:cxnSp>
         <p:nvCxnSpPr>
-          <p:cNvPr id="22" name="Straight Arrow Connector 21"/>
+          <p:cNvPr id="116" name="Straight Arrow Connector 115"/>
           <p:cNvCxnSpPr/>
           <p:nvPr/>
         </p:nvCxnSpPr>
         <p:spPr>
           <a:xfrm>
-            <a:off x="6392815" y="1239576"/>
+            <a:off x="6381635" y="360966"/>
             <a:ext cx="419034" cy="0"/>
           </a:xfrm>
           <a:prstGeom prst="straightConnector1">
@@ -4082,13 +4052,13 @@
       </p:cxnSp>
       <p:sp>
         <p:nvSpPr>
-          <p:cNvPr id="23" name="Rectangle 22"/>
+          <p:cNvPr id="117" name="Rectangle 116"/>
           <p:cNvSpPr/>
           <p:nvPr/>
         </p:nvSpPr>
         <p:spPr>
           <a:xfrm>
-            <a:off x="1874382" y="2819758"/>
+            <a:off x="1863202" y="1941148"/>
             <a:ext cx="1640939" cy="705431"/>
           </a:xfrm>
           <a:prstGeom prst="rect">
@@ -4105,13 +4075,7 @@
             </a:solidFill>
             <a:round/>
           </a:ln>
-          <a:effectLst>
-            <a:outerShdw blurRad="50800" dist="38100" dir="2700000" algn="tl" rotWithShape="0">
-              <a:prstClr val="black">
-                <a:alpha val="40000"/>
-              </a:prstClr>
-            </a:outerShdw>
-          </a:effectLst>
+          <a:effectLst/>
         </p:spPr>
         <p:style>
           <a:lnRef idx="2">
@@ -4196,13 +4160,13 @@
       </p:sp>
       <p:sp>
         <p:nvSpPr>
-          <p:cNvPr id="24" name="Rectangle 23"/>
+          <p:cNvPr id="118" name="Rectangle 117"/>
           <p:cNvSpPr/>
           <p:nvPr/>
         </p:nvSpPr>
         <p:spPr>
           <a:xfrm>
-            <a:off x="4534589" y="1895435"/>
+            <a:off x="4523409" y="1016825"/>
             <a:ext cx="1582094" cy="619732"/>
           </a:xfrm>
           <a:prstGeom prst="rect">
@@ -4219,13 +4183,7 @@
             </a:solidFill>
             <a:round/>
           </a:ln>
-          <a:effectLst>
-            <a:outerShdw blurRad="50800" dist="38100" dir="2700000" algn="tl" rotWithShape="0">
-              <a:prstClr val="black">
-                <a:alpha val="40000"/>
-              </a:prstClr>
-            </a:outerShdw>
-          </a:effectLst>
+          <a:effectLst/>
         </p:spPr>
         <p:style>
           <a:lnRef idx="2">
@@ -4270,13 +4228,13 @@
       </p:sp>
       <p:sp>
         <p:nvSpPr>
-          <p:cNvPr id="25" name="Rectangle 24"/>
+          <p:cNvPr id="119" name="Rectangle 118"/>
           <p:cNvSpPr/>
           <p:nvPr/>
         </p:nvSpPr>
         <p:spPr>
           <a:xfrm>
-            <a:off x="4541383" y="5908664"/>
+            <a:off x="4530203" y="5030054"/>
             <a:ext cx="1575303" cy="663445"/>
           </a:xfrm>
           <a:prstGeom prst="rect">
@@ -4293,13 +4251,7 @@
             </a:solidFill>
             <a:round/>
           </a:ln>
-          <a:effectLst>
-            <a:outerShdw blurRad="50800" dist="38100" dir="2700000" algn="tl" rotWithShape="0">
-              <a:prstClr val="black">
-                <a:alpha val="40000"/>
-              </a:prstClr>
-            </a:outerShdw>
-          </a:effectLst>
+          <a:effectLst/>
         </p:spPr>
         <p:style>
           <a:lnRef idx="2">
@@ -4384,13 +4336,13 @@
       </p:sp>
       <p:sp>
         <p:nvSpPr>
-          <p:cNvPr id="26" name="Rectangle 25"/>
+          <p:cNvPr id="120" name="Rectangle 119"/>
           <p:cNvSpPr/>
           <p:nvPr/>
         </p:nvSpPr>
         <p:spPr>
           <a:xfrm>
-            <a:off x="1863442" y="5750237"/>
+            <a:off x="1852262" y="4871627"/>
             <a:ext cx="1662818" cy="821872"/>
           </a:xfrm>
           <a:prstGeom prst="rect">
@@ -4407,13 +4359,7 @@
             </a:solidFill>
             <a:round/>
           </a:ln>
-          <a:effectLst>
-            <a:outerShdw blurRad="50800" dist="38100" dir="2700000" algn="tl" rotWithShape="0">
-              <a:prstClr val="black">
-                <a:alpha val="40000"/>
-              </a:prstClr>
-            </a:outerShdw>
-          </a:effectLst>
+          <a:effectLst/>
         </p:spPr>
         <p:style>
           <a:lnRef idx="2">
@@ -4518,13 +4464,13 @@
       </p:sp>
       <p:sp>
         <p:nvSpPr>
-          <p:cNvPr id="27" name="Rectangle 26"/>
+          <p:cNvPr id="121" name="Rectangle 120"/>
           <p:cNvSpPr/>
           <p:nvPr/>
         </p:nvSpPr>
         <p:spPr>
           <a:xfrm>
-            <a:off x="6813800" y="1868806"/>
+            <a:off x="6802620" y="990196"/>
             <a:ext cx="2040689" cy="971829"/>
           </a:xfrm>
           <a:prstGeom prst="rect">
@@ -4542,13 +4488,7 @@
             <a:prstDash val="solid"/>
             <a:round/>
           </a:ln>
-          <a:effectLst>
-            <a:outerShdw blurRad="50800" dist="38100" dir="2700000" algn="tl" rotWithShape="0">
-              <a:prstClr val="black">
-                <a:alpha val="40000"/>
-              </a:prstClr>
-            </a:outerShdw>
-          </a:effectLst>
+          <a:effectLst/>
         </p:spPr>
         <p:txBody>
           <a:bodyPr rtlCol="0" anchor="ctr"/>
@@ -4597,13 +4537,13 @@
       </p:sp>
       <p:sp>
         <p:nvSpPr>
-          <p:cNvPr id="28" name="Rectangle 27"/>
+          <p:cNvPr id="122" name="Rectangle 121"/>
           <p:cNvSpPr/>
           <p:nvPr/>
         </p:nvSpPr>
         <p:spPr>
           <a:xfrm>
-            <a:off x="7958315" y="5795048"/>
+            <a:off x="7947135" y="4916438"/>
             <a:ext cx="1048141" cy="787681"/>
           </a:xfrm>
           <a:prstGeom prst="rect">
@@ -4621,13 +4561,7 @@
             <a:prstDash val="solid"/>
             <a:round/>
           </a:ln>
-          <a:effectLst>
-            <a:outerShdw blurRad="50800" dist="38100" dir="2700000" algn="tl" rotWithShape="0">
-              <a:prstClr val="black">
-                <a:alpha val="40000"/>
-              </a:prstClr>
-            </a:outerShdw>
-          </a:effectLst>
+          <a:effectLst/>
         </p:spPr>
         <p:txBody>
           <a:bodyPr rtlCol="0" anchor="ctr"/>
@@ -4685,13 +4619,13 @@
       </p:sp>
       <p:sp>
         <p:nvSpPr>
-          <p:cNvPr id="29" name="Rectangle 28"/>
+          <p:cNvPr id="123" name="Rectangle 122"/>
           <p:cNvSpPr/>
           <p:nvPr/>
         </p:nvSpPr>
         <p:spPr>
           <a:xfrm>
-            <a:off x="170201" y="3645970"/>
+            <a:off x="159021" y="2767360"/>
             <a:ext cx="886991" cy="1001662"/>
           </a:xfrm>
           <a:prstGeom prst="rect">
@@ -4709,13 +4643,7 @@
             <a:prstDash val="solid"/>
             <a:round/>
           </a:ln>
-          <a:effectLst>
-            <a:outerShdw blurRad="50800" dist="38100" dir="2700000" algn="tl" rotWithShape="0">
-              <a:prstClr val="black">
-                <a:alpha val="40000"/>
-              </a:prstClr>
-            </a:outerShdw>
-          </a:effectLst>
+          <a:effectLst/>
         </p:spPr>
         <p:txBody>
           <a:bodyPr rtlCol="0" anchor="ctr"/>
@@ -4804,13 +4732,13 @@
       </p:sp>
       <p:sp>
         <p:nvSpPr>
-          <p:cNvPr id="30" name="Rectangle 29"/>
+          <p:cNvPr id="124" name="Rectangle 123"/>
           <p:cNvSpPr/>
           <p:nvPr/>
         </p:nvSpPr>
         <p:spPr>
           <a:xfrm>
-            <a:off x="1874382" y="3757771"/>
+            <a:off x="1863202" y="2879161"/>
             <a:ext cx="1640939" cy="705431"/>
           </a:xfrm>
           <a:prstGeom prst="rect">
@@ -4827,13 +4755,7 @@
             </a:solidFill>
             <a:round/>
           </a:ln>
-          <a:effectLst>
-            <a:outerShdw blurRad="50800" dist="38100" dir="2700000" algn="tl" rotWithShape="0">
-              <a:prstClr val="black">
-                <a:alpha val="40000"/>
-              </a:prstClr>
-            </a:outerShdw>
-          </a:effectLst>
+          <a:effectLst/>
         </p:spPr>
         <p:style>
           <a:lnRef idx="2">
@@ -4888,13 +4810,13 @@
       </p:sp>
       <p:sp>
         <p:nvSpPr>
-          <p:cNvPr id="31" name="Rectangle 30"/>
+          <p:cNvPr id="125" name="Rectangle 124"/>
           <p:cNvSpPr/>
           <p:nvPr/>
         </p:nvSpPr>
         <p:spPr>
           <a:xfrm>
-            <a:off x="6757774" y="5795048"/>
+            <a:off x="6746594" y="4916438"/>
             <a:ext cx="1048141" cy="787681"/>
           </a:xfrm>
           <a:prstGeom prst="rect">
@@ -4912,13 +4834,7 @@
             <a:prstDash val="solid"/>
             <a:round/>
           </a:ln>
-          <a:effectLst>
-            <a:outerShdw blurRad="50800" dist="38100" dir="2700000" algn="tl" rotWithShape="0">
-              <a:prstClr val="black">
-                <a:alpha val="40000"/>
-              </a:prstClr>
-            </a:outerShdw>
-          </a:effectLst>
+          <a:effectLst/>
         </p:spPr>
         <p:txBody>
           <a:bodyPr rtlCol="0" anchor="ctr"/>
@@ -4967,13 +4883,13 @@
       </p:sp>
       <p:sp>
         <p:nvSpPr>
-          <p:cNvPr id="32" name="Down Arrow 31"/>
+          <p:cNvPr id="126" name="Down Arrow 125"/>
           <p:cNvSpPr/>
           <p:nvPr/>
         </p:nvSpPr>
         <p:spPr>
           <a:xfrm>
-            <a:off x="7099744" y="5349058"/>
+            <a:off x="7088564" y="4470448"/>
             <a:ext cx="706171" cy="389300"/>
           </a:xfrm>
           <a:prstGeom prst="downArrow">
@@ -5013,13 +4929,13 @@
       </p:sp>
       <p:sp>
         <p:nvSpPr>
-          <p:cNvPr id="33" name="Rectangle 32"/>
+          <p:cNvPr id="127" name="Rectangle 126"/>
           <p:cNvSpPr/>
           <p:nvPr/>
         </p:nvSpPr>
         <p:spPr>
           <a:xfrm>
-            <a:off x="4533492" y="5152756"/>
+            <a:off x="4522312" y="4274146"/>
             <a:ext cx="1575303" cy="663445"/>
           </a:xfrm>
           <a:prstGeom prst="rect">
@@ -5036,13 +4952,7 @@
             </a:solidFill>
             <a:round/>
           </a:ln>
-          <a:effectLst>
-            <a:outerShdw blurRad="50800" dist="38100" dir="2700000" algn="tl" rotWithShape="0">
-              <a:prstClr val="black">
-                <a:alpha val="40000"/>
-              </a:prstClr>
-            </a:outerShdw>
-          </a:effectLst>
+          <a:effectLst/>
         </p:spPr>
         <p:style>
           <a:lnRef idx="2">
@@ -5127,7 +5037,7 @@
       </p:sp>
       <p:pic>
         <p:nvPicPr>
-          <p:cNvPr id="34" name="Picture 4" descr="http://www.iconsdb.com/icons/preview/icon-sets/web-2-blue/database-xxl.png"/>
+          <p:cNvPr id="128" name="Picture 4" descr="http://www.iconsdb.com/icons/preview/icon-sets/web-2-blue/database-xxl.png"/>
           <p:cNvPicPr>
             <a:picLocks noChangeAspect="1" noChangeArrowheads="1"/>
           </p:cNvPicPr>
@@ -5148,7 +5058,7 @@
         </p:blipFill>
         <p:spPr bwMode="auto">
           <a:xfrm>
-            <a:off x="6960447" y="3480569"/>
+            <a:off x="6949267" y="2601959"/>
             <a:ext cx="1741936" cy="1741936"/>
           </a:xfrm>
           <a:prstGeom prst="rect">
@@ -5156,7 +5066,7 @@
           </a:prstGeom>
           <a:noFill/>
           <a:extLst>
-            <a:ext uri="{909E8E84-426E-40DD-AFC4-6F175D3DCCD1}">
+            <a:ext uri="{909E8E84-426E-40dd-AFC4-6F175D3DCCD1}">
               <a14:hiddenFill xmlns:a14="http://schemas.microsoft.com/office/drawing/2010/main">
                 <a:solidFill>
                   <a:srgbClr val="FFFFFF"/>
@@ -5179,7 +5089,7 @@
   <p:timing>
     <p:tnLst>
       <p:par>
-        <p:cTn id="1" dur="indefinite" restart="never" nodeType="tmRoot"/>
+        <p:cTn xmlns:p14="http://schemas.microsoft.com/office/powerpoint/2010/main" id="1" dur="indefinite" restart="never" nodeType="tmRoot"/>
       </p:par>
     </p:tnLst>
   </p:timing>
@@ -5229,7 +5139,7 @@
     </a:clrScheme>
     <a:fontScheme name="Office Theme">
       <a:majorFont>
-        <a:latin typeface="Calibri Light" panose="020F0302020204030204"/>
+        <a:latin typeface="Calibri Light"/>
         <a:ea typeface=""/>
         <a:cs typeface=""/>
         <a:font script="Jpan" typeface="游ゴシック Light"/>
@@ -5264,7 +5174,7 @@
         <a:font script="Geor" typeface="Sylfaen"/>
       </a:majorFont>
       <a:minorFont>
-        <a:latin typeface="Calibri" panose="020F0502020204030204"/>
+        <a:latin typeface="Calibri"/>
         <a:ea typeface=""/>
         <a:cs typeface=""/>
         <a:font script="Jpan" typeface="游ゴシック"/>
@@ -5441,7 +5351,7 @@
   <a:extraClrSchemeLst/>
   <a:extLst>
     <a:ext uri="{05A4C25C-085E-4340-85A3-A5531E510DB2}">
-      <thm15:themeFamily xmlns:thm15="http://schemas.microsoft.com/office/thememl/2012/main" name="Office Theme" id="{62F939B6-93AF-4DB8-9C6B-D6C7DFDC589F}" vid="{4A3C46E8-61CC-4603-A589-7422A47A8E4A}"/>
+      <thm15:themeFamily xmlns:thm15="http://schemas.microsoft.com/office/thememl/2012/main" xmlns="" name="Office Theme" id="{62F939B6-93AF-4DB8-9C6B-D6C7DFDC589F}" vid="{4A3C46E8-61CC-4603-A589-7422A47A8E4A}"/>
     </a:ext>
   </a:extLst>
 </a:theme>

</xml_diff>